<commit_message>
Add architecture5.0 to architecture-slides
</commit_message>
<xml_diff>
--- a/documentation/architecture.pptx
+++ b/documentation/architecture.pptx
@@ -5,7 +5,7 @@
     <p:sldMasterId id="2147483659" r:id="rId1"/>
   </p:sldMasterIdLst>
   <p:notesMasterIdLst>
-    <p:notesMasterId r:id="rId10"/>
+    <p:notesMasterId r:id="rId11"/>
   </p:notesMasterIdLst>
   <p:sldIdLst>
     <p:sldId id="256" r:id="rId2"/>
@@ -15,7 +15,8 @@
     <p:sldId id="261" r:id="rId6"/>
     <p:sldId id="262" r:id="rId7"/>
     <p:sldId id="263" r:id="rId8"/>
-    <p:sldId id="260" r:id="rId9"/>
+    <p:sldId id="264" r:id="rId9"/>
+    <p:sldId id="260" r:id="rId10"/>
   </p:sldIdLst>
   <p:sldSz cx="9144000" cy="5143500" type="screen16x9"/>
   <p:notesSz cx="6858000" cy="9144000"/>
@@ -3036,6 +3037,499 @@
 </file>
 
 <file path=ppt/notesSlides/notesSlide8.xml><?xml version="1.0" encoding="utf-8"?>
+<p:notes xmlns:a="http://schemas.openxmlformats.org/drawingml/2006/main" xmlns:r="http://schemas.openxmlformats.org/officeDocument/2006/relationships" xmlns:p="http://schemas.openxmlformats.org/presentationml/2006/main">
+  <p:cSld>
+    <p:spTree>
+      <p:nvGrpSpPr>
+        <p:cNvPr id="1" name=""/>
+        <p:cNvGrpSpPr/>
+        <p:nvPr/>
+      </p:nvGrpSpPr>
+      <p:grpSpPr>
+        <a:xfrm>
+          <a:off x="0" y="0"/>
+          <a:ext cx="0" cy="0"/>
+          <a:chOff x="0" y="0"/>
+          <a:chExt cx="0" cy="0"/>
+        </a:xfrm>
+      </p:grpSpPr>
+      <p:sp>
+        <p:nvSpPr>
+          <p:cNvPr id="2" name="Folienbildplatzhalter 1"/>
+          <p:cNvSpPr>
+            <a:spLocks noGrp="1" noRot="1" noChangeAspect="1"/>
+          </p:cNvSpPr>
+          <p:nvPr>
+            <p:ph type="sldImg"/>
+          </p:nvPr>
+        </p:nvSpPr>
+        <p:spPr>
+          <a:xfrm>
+            <a:off x="381000" y="685800"/>
+            <a:ext cx="6096000" cy="3429000"/>
+          </a:xfrm>
+        </p:spPr>
+      </p:sp>
+      <p:sp>
+        <p:nvSpPr>
+          <p:cNvPr id="3" name="Notizenplatzhalter 2"/>
+          <p:cNvSpPr>
+            <a:spLocks noGrp="1"/>
+          </p:cNvSpPr>
+          <p:nvPr>
+            <p:ph type="body" idx="1"/>
+          </p:nvPr>
+        </p:nvSpPr>
+        <p:spPr/>
+        <p:txBody>
+          <a:bodyPr/>
+          <a:lstStyle/>
+          <a:p>
+            <a:pPr marL="158750" indent="0">
+              <a:buNone/>
+            </a:pPr>
+            <a:r>
+              <a:rPr lang="de-DE" dirty="0" err="1" smtClean="0"/>
+              <a:t>Changes</a:t>
+            </a:r>
+            <a:r>
+              <a:rPr lang="de-DE" baseline="0" dirty="0" smtClean="0"/>
+              <a:t> </a:t>
+            </a:r>
+            <a:r>
+              <a:rPr lang="de-DE" baseline="0" dirty="0" smtClean="0"/>
+              <a:t>(4.0 </a:t>
+            </a:r>
+            <a:r>
+              <a:rPr lang="de-DE" baseline="0" dirty="0" smtClean="0">
+                <a:sym typeface="Wingdings" panose="05000000000000000000" pitchFamily="2" charset="2"/>
+              </a:rPr>
+              <a:t> </a:t>
+            </a:r>
+            <a:r>
+              <a:rPr lang="de-DE" baseline="0" dirty="0" smtClean="0">
+                <a:sym typeface="Wingdings" panose="05000000000000000000" pitchFamily="2" charset="2"/>
+              </a:rPr>
+              <a:t>5.0</a:t>
+            </a:r>
+            <a:r>
+              <a:rPr lang="de-DE" baseline="0" dirty="0" smtClean="0">
+                <a:sym typeface="Wingdings" panose="05000000000000000000" pitchFamily="2" charset="2"/>
+              </a:rPr>
+              <a:t>)</a:t>
+            </a:r>
+          </a:p>
+          <a:p>
+            <a:pPr marL="457200" indent="-298450">
+              <a:buFont typeface="Symbol" panose="05050102010706020507" pitchFamily="18" charset="2"/>
+              <a:buChar char="-"/>
+            </a:pPr>
+            <a:r>
+              <a:rPr lang="de-DE" dirty="0" smtClean="0"/>
+              <a:t>New </a:t>
+            </a:r>
+            <a:r>
+              <a:rPr lang="de-DE" dirty="0" err="1" smtClean="0"/>
+              <a:t>component</a:t>
+            </a:r>
+            <a:r>
+              <a:rPr lang="de-DE" baseline="0" dirty="0" smtClean="0"/>
+              <a:t> </a:t>
+            </a:r>
+            <a:r>
+              <a:rPr lang="de-DE" baseline="0" dirty="0" err="1" smtClean="0"/>
+              <a:t>signing</a:t>
+            </a:r>
+            <a:r>
+              <a:rPr lang="de-DE" baseline="0" dirty="0" smtClean="0"/>
+              <a:t> </a:t>
+            </a:r>
+            <a:r>
+              <a:rPr lang="de-DE" baseline="0" dirty="0" err="1" smtClean="0"/>
+              <a:t>the</a:t>
+            </a:r>
+            <a:r>
+              <a:rPr lang="de-DE" baseline="0" dirty="0" smtClean="0"/>
+              <a:t> </a:t>
+            </a:r>
+            <a:r>
+              <a:rPr lang="de-DE" baseline="0" dirty="0" err="1" smtClean="0"/>
+              <a:t>sensor</a:t>
+            </a:r>
+            <a:r>
+              <a:rPr lang="de-DE" baseline="0" dirty="0" smtClean="0"/>
+              <a:t> </a:t>
+            </a:r>
+            <a:r>
+              <a:rPr lang="de-DE" baseline="0" dirty="0" err="1" smtClean="0"/>
+              <a:t>data</a:t>
+            </a:r>
+            <a:r>
+              <a:rPr lang="de-DE" baseline="0" dirty="0" smtClean="0"/>
+              <a:t> </a:t>
+            </a:r>
+            <a:r>
+              <a:rPr lang="de-DE" baseline="0" dirty="0" err="1" smtClean="0"/>
+              <a:t>within</a:t>
+            </a:r>
+            <a:r>
+              <a:rPr lang="de-DE" baseline="0" dirty="0" smtClean="0"/>
+              <a:t> </a:t>
+            </a:r>
+            <a:r>
+              <a:rPr lang="de-DE" baseline="0" dirty="0" err="1" smtClean="0"/>
+              <a:t>the</a:t>
+            </a:r>
+            <a:r>
+              <a:rPr lang="de-DE" baseline="0" dirty="0" smtClean="0"/>
+              <a:t> smart </a:t>
+            </a:r>
+            <a:r>
+              <a:rPr lang="de-DE" baseline="0" dirty="0" err="1" smtClean="0"/>
+              <a:t>meter</a:t>
+            </a:r>
+            <a:endParaRPr lang="de-DE" baseline="0" dirty="0" smtClean="0"/>
+          </a:p>
+          <a:p>
+            <a:pPr marL="457200" indent="-298450">
+              <a:buFont typeface="Symbol" panose="05050102010706020507" pitchFamily="18" charset="2"/>
+              <a:buChar char="-"/>
+            </a:pPr>
+            <a:r>
+              <a:rPr lang="de-DE" baseline="0" dirty="0" err="1" smtClean="0"/>
+              <a:t>Rename</a:t>
+            </a:r>
+            <a:r>
+              <a:rPr lang="de-DE" baseline="0" dirty="0" smtClean="0"/>
+              <a:t> </a:t>
+            </a:r>
+            <a:r>
+              <a:rPr lang="de-DE" baseline="0" dirty="0" err="1" smtClean="0"/>
+              <a:t>Deeds</a:t>
+            </a:r>
+            <a:r>
+              <a:rPr lang="de-DE" baseline="0" dirty="0" smtClean="0"/>
+              <a:t> </a:t>
+            </a:r>
+            <a:r>
+              <a:rPr lang="de-DE" baseline="0" dirty="0" smtClean="0">
+                <a:sym typeface="Wingdings" panose="05000000000000000000" pitchFamily="2" charset="2"/>
+              </a:rPr>
+              <a:t> </a:t>
+            </a:r>
+            <a:r>
+              <a:rPr lang="de-DE" baseline="0" dirty="0" err="1" smtClean="0">
+                <a:sym typeface="Wingdings" panose="05000000000000000000" pitchFamily="2" charset="2"/>
+              </a:rPr>
+              <a:t>Energy</a:t>
+            </a:r>
+            <a:r>
+              <a:rPr lang="de-DE" baseline="0" dirty="0" smtClean="0">
+                <a:sym typeface="Wingdings" panose="05000000000000000000" pitchFamily="2" charset="2"/>
+              </a:rPr>
+              <a:t> Transfer </a:t>
+            </a:r>
+            <a:r>
+              <a:rPr lang="de-DE" baseline="0" dirty="0" err="1" smtClean="0">
+                <a:sym typeface="Wingdings" panose="05000000000000000000" pitchFamily="2" charset="2"/>
+              </a:rPr>
+              <a:t>Receipt</a:t>
+            </a:r>
+            <a:endParaRPr lang="de-DE" baseline="0" dirty="0" smtClean="0">
+              <a:sym typeface="Wingdings" panose="05000000000000000000" pitchFamily="2" charset="2"/>
+            </a:endParaRPr>
+          </a:p>
+          <a:p>
+            <a:pPr marL="457200" indent="-298450">
+              <a:buFont typeface="Symbol" panose="05050102010706020507" pitchFamily="18" charset="2"/>
+              <a:buChar char="-"/>
+            </a:pPr>
+            <a:r>
+              <a:rPr lang="de-DE" baseline="0" dirty="0" err="1" smtClean="0">
+                <a:sym typeface="Wingdings" panose="05000000000000000000" pitchFamily="2" charset="2"/>
+              </a:rPr>
+              <a:t>dUtility</a:t>
+            </a:r>
+            <a:r>
+              <a:rPr lang="de-DE" baseline="0" dirty="0" smtClean="0">
+                <a:sym typeface="Wingdings" panose="05000000000000000000" pitchFamily="2" charset="2"/>
+              </a:rPr>
+              <a:t> </a:t>
+            </a:r>
+            <a:r>
+              <a:rPr lang="de-DE" baseline="0" dirty="0" err="1" smtClean="0">
+                <a:sym typeface="Wingdings" panose="05000000000000000000" pitchFamily="2" charset="2"/>
+              </a:rPr>
+              <a:t>is</a:t>
+            </a:r>
+            <a:r>
+              <a:rPr lang="de-DE" baseline="0" dirty="0" smtClean="0">
+                <a:sym typeface="Wingdings" panose="05000000000000000000" pitchFamily="2" charset="2"/>
+              </a:rPr>
+              <a:t> </a:t>
+            </a:r>
+            <a:r>
+              <a:rPr lang="de-DE" baseline="0" dirty="0" err="1" smtClean="0">
+                <a:sym typeface="Wingdings" panose="05000000000000000000" pitchFamily="2" charset="2"/>
+              </a:rPr>
+              <a:t>only</a:t>
+            </a:r>
+            <a:r>
+              <a:rPr lang="de-DE" baseline="0" dirty="0" smtClean="0">
+                <a:sym typeface="Wingdings" panose="05000000000000000000" pitchFamily="2" charset="2"/>
+              </a:rPr>
+              <a:t> </a:t>
+            </a:r>
+            <a:r>
+              <a:rPr lang="de-DE" baseline="0" dirty="0" err="1" smtClean="0">
+                <a:sym typeface="Wingdings" panose="05000000000000000000" pitchFamily="2" charset="2"/>
+              </a:rPr>
+              <a:t>one</a:t>
+            </a:r>
+            <a:r>
+              <a:rPr lang="de-DE" baseline="0" dirty="0" smtClean="0">
+                <a:sym typeface="Wingdings" panose="05000000000000000000" pitchFamily="2" charset="2"/>
+              </a:rPr>
+              <a:t> </a:t>
+            </a:r>
+            <a:r>
+              <a:rPr lang="de-DE" baseline="0" dirty="0" err="1" smtClean="0">
+                <a:sym typeface="Wingdings" panose="05000000000000000000" pitchFamily="2" charset="2"/>
+              </a:rPr>
+              <a:t>Contract</a:t>
+            </a:r>
+            <a:r>
+              <a:rPr lang="de-DE" baseline="0" dirty="0" smtClean="0">
+                <a:sym typeface="Wingdings" panose="05000000000000000000" pitchFamily="2" charset="2"/>
+              </a:rPr>
+              <a:t> </a:t>
+            </a:r>
+            <a:r>
+              <a:rPr lang="de-DE" baseline="0" dirty="0" err="1" smtClean="0">
+                <a:sym typeface="Wingdings" panose="05000000000000000000" pitchFamily="2" charset="2"/>
+              </a:rPr>
+              <a:t>while</a:t>
+            </a:r>
+            <a:r>
+              <a:rPr lang="de-DE" baseline="0" dirty="0" smtClean="0">
+                <a:sym typeface="Wingdings" panose="05000000000000000000" pitchFamily="2" charset="2"/>
+              </a:rPr>
+              <a:t> </a:t>
+            </a:r>
+            <a:r>
+              <a:rPr lang="de-DE" baseline="0" dirty="0" err="1" smtClean="0">
+                <a:sym typeface="Wingdings" panose="05000000000000000000" pitchFamily="2" charset="2"/>
+              </a:rPr>
+              <a:t>the</a:t>
+            </a:r>
+            <a:r>
+              <a:rPr lang="de-DE" baseline="0" dirty="0" smtClean="0">
+                <a:sym typeface="Wingdings" panose="05000000000000000000" pitchFamily="2" charset="2"/>
+              </a:rPr>
+              <a:t> </a:t>
+            </a:r>
+            <a:r>
+              <a:rPr lang="de-DE" baseline="0" dirty="0" err="1" smtClean="0">
+                <a:sym typeface="Wingdings" panose="05000000000000000000" pitchFamily="2" charset="2"/>
+              </a:rPr>
+              <a:t>Validator</a:t>
+            </a:r>
+            <a:r>
+              <a:rPr lang="de-DE" baseline="0" dirty="0" smtClean="0">
+                <a:sym typeface="Wingdings" panose="05000000000000000000" pitchFamily="2" charset="2"/>
+              </a:rPr>
+              <a:t> Set </a:t>
+            </a:r>
+            <a:r>
+              <a:rPr lang="de-DE" baseline="0" dirty="0" err="1" smtClean="0">
+                <a:sym typeface="Wingdings" panose="05000000000000000000" pitchFamily="2" charset="2"/>
+              </a:rPr>
+              <a:t>consists</a:t>
+            </a:r>
+            <a:r>
+              <a:rPr lang="de-DE" baseline="0" dirty="0" smtClean="0">
+                <a:sym typeface="Wingdings" panose="05000000000000000000" pitchFamily="2" charset="2"/>
+              </a:rPr>
+              <a:t> </a:t>
+            </a:r>
+            <a:r>
+              <a:rPr lang="de-DE" baseline="0" dirty="0" err="1" smtClean="0">
+                <a:sym typeface="Wingdings" panose="05000000000000000000" pitchFamily="2" charset="2"/>
+              </a:rPr>
+              <a:t>of</a:t>
+            </a:r>
+            <a:r>
+              <a:rPr lang="de-DE" baseline="0" dirty="0" smtClean="0">
+                <a:sym typeface="Wingdings" panose="05000000000000000000" pitchFamily="2" charset="2"/>
+              </a:rPr>
+              <a:t> </a:t>
+            </a:r>
+            <a:r>
+              <a:rPr lang="de-DE" baseline="0" dirty="0" err="1" smtClean="0">
+                <a:sym typeface="Wingdings" panose="05000000000000000000" pitchFamily="2" charset="2"/>
+              </a:rPr>
+              <a:t>several</a:t>
+            </a:r>
+            <a:r>
+              <a:rPr lang="de-DE" baseline="0" dirty="0" smtClean="0">
+                <a:sym typeface="Wingdings" panose="05000000000000000000" pitchFamily="2" charset="2"/>
+              </a:rPr>
+              <a:t> </a:t>
+            </a:r>
+            <a:r>
+              <a:rPr lang="de-DE" baseline="0" dirty="0" err="1" smtClean="0">
+                <a:sym typeface="Wingdings" panose="05000000000000000000" pitchFamily="2" charset="2"/>
+              </a:rPr>
+              <a:t>contracts</a:t>
+            </a:r>
+            <a:r>
+              <a:rPr lang="de-DE" baseline="0" dirty="0" smtClean="0">
+                <a:sym typeface="Wingdings" panose="05000000000000000000" pitchFamily="2" charset="2"/>
+              </a:rPr>
+              <a:t> </a:t>
+            </a:r>
+          </a:p>
+          <a:p>
+            <a:pPr marL="914400" lvl="1" indent="-298450">
+              <a:buFont typeface="Symbol" panose="05050102010706020507" pitchFamily="18" charset="2"/>
+              <a:buChar char="-"/>
+            </a:pPr>
+            <a:r>
+              <a:rPr lang="de-DE" baseline="0" dirty="0" err="1" smtClean="0">
+                <a:sym typeface="Wingdings" panose="05000000000000000000" pitchFamily="2" charset="2"/>
+              </a:rPr>
+              <a:t>dUtility</a:t>
+            </a:r>
+            <a:r>
+              <a:rPr lang="de-DE" baseline="0" dirty="0" smtClean="0">
+                <a:sym typeface="Wingdings" panose="05000000000000000000" pitchFamily="2" charset="2"/>
+              </a:rPr>
+              <a:t> = </a:t>
+            </a:r>
+            <a:r>
+              <a:rPr lang="de-DE" baseline="0" dirty="0" err="1" smtClean="0">
+                <a:sym typeface="Wingdings" panose="05000000000000000000" pitchFamily="2" charset="2"/>
+              </a:rPr>
+              <a:t>only</a:t>
+            </a:r>
+            <a:r>
+              <a:rPr lang="de-DE" baseline="0" dirty="0" smtClean="0">
+                <a:sym typeface="Wingdings" panose="05000000000000000000" pitchFamily="2" charset="2"/>
+              </a:rPr>
+              <a:t> </a:t>
+            </a:r>
+            <a:r>
+              <a:rPr lang="de-DE" baseline="0" dirty="0" err="1" smtClean="0">
+                <a:sym typeface="Wingdings" panose="05000000000000000000" pitchFamily="2" charset="2"/>
+              </a:rPr>
+              <a:t>one</a:t>
+            </a:r>
+            <a:r>
+              <a:rPr lang="de-DE" baseline="0" dirty="0" smtClean="0">
+                <a:sym typeface="Wingdings" panose="05000000000000000000" pitchFamily="2" charset="2"/>
+              </a:rPr>
+              <a:t> </a:t>
+            </a:r>
+            <a:r>
+              <a:rPr lang="de-DE" baseline="0" dirty="0" err="1" smtClean="0">
+                <a:sym typeface="Wingdings" panose="05000000000000000000" pitchFamily="2" charset="2"/>
+              </a:rPr>
+              <a:t>address</a:t>
+            </a:r>
+            <a:endParaRPr lang="de-DE" baseline="0" dirty="0" smtClean="0">
+              <a:sym typeface="Wingdings" panose="05000000000000000000" pitchFamily="2" charset="2"/>
+            </a:endParaRPr>
+          </a:p>
+          <a:p>
+            <a:pPr marL="914400" lvl="1" indent="-298450">
+              <a:buFont typeface="Symbol" panose="05050102010706020507" pitchFamily="18" charset="2"/>
+              <a:buChar char="-"/>
+            </a:pPr>
+            <a:r>
+              <a:rPr lang="de-DE" baseline="0" dirty="0" smtClean="0">
+                <a:sym typeface="Wingdings" panose="05000000000000000000" pitchFamily="2" charset="2"/>
+              </a:rPr>
+              <a:t>VS </a:t>
+            </a:r>
+            <a:r>
+              <a:rPr lang="de-DE" baseline="0" dirty="0" err="1" smtClean="0">
+                <a:sym typeface="Wingdings" panose="05000000000000000000" pitchFamily="2" charset="2"/>
+              </a:rPr>
+              <a:t>includes</a:t>
+            </a:r>
+            <a:r>
+              <a:rPr lang="de-DE" baseline="0" dirty="0" smtClean="0">
+                <a:sym typeface="Wingdings" panose="05000000000000000000" pitchFamily="2" charset="2"/>
+              </a:rPr>
+              <a:t> </a:t>
+            </a:r>
+            <a:r>
+              <a:rPr lang="de-DE" baseline="0" dirty="0" err="1" smtClean="0">
+                <a:sym typeface="Wingdings" panose="05000000000000000000" pitchFamily="2" charset="2"/>
+              </a:rPr>
+              <a:t>for</a:t>
+            </a:r>
+            <a:r>
+              <a:rPr lang="de-DE" baseline="0" dirty="0" smtClean="0">
+                <a:sym typeface="Wingdings" panose="05000000000000000000" pitchFamily="2" charset="2"/>
+              </a:rPr>
+              <a:t> </a:t>
+            </a:r>
+            <a:r>
+              <a:rPr lang="de-DE" baseline="0" dirty="0" err="1" smtClean="0">
+                <a:sym typeface="Wingdings" panose="05000000000000000000" pitchFamily="2" charset="2"/>
+              </a:rPr>
+              <a:t>example</a:t>
+            </a:r>
+            <a:r>
+              <a:rPr lang="de-DE" baseline="0" dirty="0" smtClean="0">
+                <a:sym typeface="Wingdings" panose="05000000000000000000" pitchFamily="2" charset="2"/>
+              </a:rPr>
+              <a:t> </a:t>
+            </a:r>
+            <a:r>
+              <a:rPr lang="de-DE" baseline="0" smtClean="0">
+                <a:sym typeface="Wingdings" panose="05000000000000000000" pitchFamily="2" charset="2"/>
+              </a:rPr>
+              <a:t>the </a:t>
+            </a:r>
+            <a:r>
+              <a:rPr lang="de-DE" baseline="0" dirty="0" smtClean="0">
+                <a:sym typeface="Wingdings" panose="05000000000000000000" pitchFamily="2" charset="2"/>
+              </a:rPr>
+              <a:t>Block </a:t>
+            </a:r>
+            <a:r>
+              <a:rPr lang="de-DE" baseline="0" dirty="0" err="1" smtClean="0">
+                <a:sym typeface="Wingdings" panose="05000000000000000000" pitchFamily="2" charset="2"/>
+              </a:rPr>
+              <a:t>Reward</a:t>
+            </a:r>
+            <a:endParaRPr lang="de-DE" baseline="0" dirty="0" smtClean="0"/>
+          </a:p>
+          <a:p>
+            <a:pPr marL="457200" indent="-298450">
+              <a:buFont typeface="Symbol" panose="05050102010706020507" pitchFamily="18" charset="2"/>
+              <a:buChar char="-"/>
+            </a:pPr>
+            <a:endParaRPr lang="de-DE" baseline="0" dirty="0" smtClean="0"/>
+          </a:p>
+        </p:txBody>
+      </p:sp>
+    </p:spTree>
+    <p:extLst>
+      <p:ext uri="{BB962C8B-B14F-4D97-AF65-F5344CB8AC3E}">
+        <p14:creationId xmlns:p14="http://schemas.microsoft.com/office/powerpoint/2010/main" val="2289461108"/>
+      </p:ext>
+    </p:extLst>
+  </p:cSld>
+  <p:clrMapOvr>
+    <a:masterClrMapping/>
+  </p:clrMapOvr>
+</p:notes>
+</file>
+
+<file path=ppt/notesSlides/notesSlide9.xml><?xml version="1.0" encoding="utf-8"?>
 <p:notes xmlns:a="http://schemas.openxmlformats.org/drawingml/2006/main" xmlns:r="http://schemas.openxmlformats.org/officeDocument/2006/relationships" xmlns:p="http://schemas.openxmlformats.org/presentationml/2006/main" showMasterSp="0" showMasterPhAnim="0">
   <p:cSld>
     <p:spTree>
@@ -10209,6 +10703,105 @@
   <p:cSld>
     <p:spTree>
       <p:nvGrpSpPr>
+        <p:cNvPr id="1" name=""/>
+        <p:cNvGrpSpPr/>
+        <p:nvPr/>
+      </p:nvGrpSpPr>
+      <p:grpSpPr>
+        <a:xfrm>
+          <a:off x="0" y="0"/>
+          <a:ext cx="0" cy="0"/>
+          <a:chOff x="0" y="0"/>
+          <a:chExt cx="0" cy="0"/>
+        </a:xfrm>
+      </p:grpSpPr>
+      <p:sp>
+        <p:nvSpPr>
+          <p:cNvPr id="2" name="Titel 1"/>
+          <p:cNvSpPr>
+            <a:spLocks noGrp="1"/>
+          </p:cNvSpPr>
+          <p:nvPr>
+            <p:ph type="title"/>
+          </p:nvPr>
+        </p:nvSpPr>
+        <p:spPr/>
+        <p:txBody>
+          <a:bodyPr/>
+          <a:lstStyle/>
+          <a:p>
+            <a:r>
+              <a:rPr lang="de-DE" dirty="0" err="1" smtClean="0"/>
+              <a:t>Architecture</a:t>
+            </a:r>
+            <a:r>
+              <a:rPr lang="de-DE" dirty="0" smtClean="0"/>
+              <a:t> 5.0</a:t>
+            </a:r>
+            <a:endParaRPr lang="de-DE" dirty="0"/>
+          </a:p>
+        </p:txBody>
+      </p:sp>
+      <p:pic>
+        <p:nvPicPr>
+          <p:cNvPr id="3" name="Grafik 2"/>
+          <p:cNvPicPr>
+            <a:picLocks noChangeAspect="1"/>
+          </p:cNvPicPr>
+          <p:nvPr/>
+        </p:nvPicPr>
+        <p:blipFill>
+          <a:blip r:embed="rId3">
+            <a:extLst>
+              <a:ext uri="{28A0092B-C50C-407E-A947-70E740481C1C}">
+                <a14:useLocalDpi xmlns:a14="http://schemas.microsoft.com/office/drawing/2010/main" val="0"/>
+              </a:ext>
+            </a:extLst>
+          </a:blip>
+          <a:stretch>
+            <a:fillRect/>
+          </a:stretch>
+        </p:blipFill>
+        <p:spPr>
+          <a:xfrm>
+            <a:off x="588398" y="1211493"/>
+            <a:ext cx="8243902" cy="3360507"/>
+          </a:xfrm>
+          <a:prstGeom prst="rect">
+            <a:avLst/>
+          </a:prstGeom>
+          <a:ln w="28575">
+            <a:solidFill>
+              <a:schemeClr val="tx1"/>
+            </a:solidFill>
+          </a:ln>
+        </p:spPr>
+      </p:pic>
+    </p:spTree>
+    <p:extLst>
+      <p:ext uri="{BB962C8B-B14F-4D97-AF65-F5344CB8AC3E}">
+        <p14:creationId xmlns:p14="http://schemas.microsoft.com/office/powerpoint/2010/main" val="1915620092"/>
+      </p:ext>
+    </p:extLst>
+  </p:cSld>
+  <p:clrMapOvr>
+    <a:masterClrMapping/>
+  </p:clrMapOvr>
+  <p:timing>
+    <p:tnLst>
+      <p:par>
+        <p:cTn id="1" dur="indefinite" restart="never" nodeType="tmRoot"/>
+      </p:par>
+    </p:tnLst>
+  </p:timing>
+</p:sld>
+</file>
+
+<file path=ppt/slides/slide9.xml><?xml version="1.0" encoding="utf-8"?>
+<p:sld xmlns:a="http://schemas.openxmlformats.org/drawingml/2006/main" xmlns:r="http://schemas.openxmlformats.org/officeDocument/2006/relationships" xmlns:p="http://schemas.openxmlformats.org/presentationml/2006/main">
+  <p:cSld>
+    <p:spTree>
+      <p:nvGrpSpPr>
         <p:cNvPr id="1" name="Shape 105"/>
         <p:cNvGrpSpPr/>
         <p:nvPr/>

</xml_diff>

<commit_message>
Update architecture (small changes)
</commit_message>
<xml_diff>
--- a/documentation/architecture.pptx
+++ b/documentation/architecture.pptx
@@ -1218,27 +1218,14 @@
             </a:r>
             <a:r>
               <a:rPr lang="de-DE" baseline="0" dirty="0" smtClean="0"/>
-              <a:t> </a:t>
-            </a:r>
-            <a:r>
-              <a:rPr lang="de-DE" baseline="0" dirty="0" smtClean="0"/>
-              <a:t>(6.0 </a:t>
+              <a:t> (6.0 </a:t>
             </a:r>
             <a:r>
               <a:rPr lang="de-DE" baseline="0" dirty="0" smtClean="0">
                 <a:sym typeface="Wingdings" panose="05000000000000000000" pitchFamily="2" charset="2"/>
               </a:rPr>
-              <a:t> </a:t>
-            </a:r>
-            <a:r>
-              <a:rPr lang="de-DE" baseline="0" dirty="0" smtClean="0">
-                <a:sym typeface="Wingdings" panose="05000000000000000000" pitchFamily="2" charset="2"/>
-              </a:rPr>
-              <a:t>7.0)</a:t>
-            </a:r>
-            <a:endParaRPr lang="de-DE" baseline="0" dirty="0" smtClean="0">
-              <a:sym typeface="Wingdings" panose="05000000000000000000" pitchFamily="2" charset="2"/>
-            </a:endParaRPr>
+              <a:t> 7.0)</a:t>
+            </a:r>
           </a:p>
           <a:p>
             <a:pPr marL="457200" indent="-298450">
@@ -9480,11 +9467,7 @@
             </a:r>
             <a:r>
               <a:rPr lang="de-DE" dirty="0" smtClean="0"/>
-              <a:t> </a:t>
-            </a:r>
-            <a:r>
-              <a:rPr lang="de-DE" dirty="0" smtClean="0"/>
-              <a:t>7.0</a:t>
+              <a:t> 7.0</a:t>
             </a:r>
             <a:endParaRPr lang="de-DE" dirty="0"/>
           </a:p>
@@ -9492,7 +9475,7 @@
       </p:sp>
       <p:pic>
         <p:nvPicPr>
-          <p:cNvPr id="5" name="Grafik 4"/>
+          <p:cNvPr id="3" name="Grafik 2"/>
           <p:cNvPicPr>
             <a:picLocks noChangeAspect="1"/>
           </p:cNvPicPr>
@@ -9512,8 +9495,8 @@
         </p:blipFill>
         <p:spPr>
           <a:xfrm>
-            <a:off x="1187205" y="1017725"/>
-            <a:ext cx="6769590" cy="3891896"/>
+            <a:off x="1129015" y="1017725"/>
+            <a:ext cx="6885969" cy="3950416"/>
           </a:xfrm>
           <a:prstGeom prst="rect">
             <a:avLst/>

</xml_diff>